<commit_message>
fixed the last slide
</commit_message>
<xml_diff>
--- a/ui/Wirefram draft.pptx
+++ b/ui/Wirefram draft.pptx
@@ -294,7 +294,7 @@
           <a:p>
             <a:fld id="{1D5F9507-541F-2F48-AAED-03061445739A}" type="datetimeFigureOut">
               <a:rPr lang="en-US" smtClean="0"/>
-              <a:t>10/11/12</a:t>
+              <a:t>10/16/12</a:t>
             </a:fld>
             <a:endParaRPr lang="en-US"/>
           </a:p>
@@ -464,7 +464,7 @@
           <a:p>
             <a:fld id="{1D5F9507-541F-2F48-AAED-03061445739A}" type="datetimeFigureOut">
               <a:rPr lang="en-US" smtClean="0"/>
-              <a:t>10/11/12</a:t>
+              <a:t>10/16/12</a:t>
             </a:fld>
             <a:endParaRPr lang="en-US"/>
           </a:p>
@@ -644,7 +644,7 @@
           <a:p>
             <a:fld id="{1D5F9507-541F-2F48-AAED-03061445739A}" type="datetimeFigureOut">
               <a:rPr lang="en-US" smtClean="0"/>
-              <a:t>10/11/12</a:t>
+              <a:t>10/16/12</a:t>
             </a:fld>
             <a:endParaRPr lang="en-US"/>
           </a:p>
@@ -814,7 +814,7 @@
           <a:p>
             <a:fld id="{1D5F9507-541F-2F48-AAED-03061445739A}" type="datetimeFigureOut">
               <a:rPr lang="en-US" smtClean="0"/>
-              <a:t>10/11/12</a:t>
+              <a:t>10/16/12</a:t>
             </a:fld>
             <a:endParaRPr lang="en-US"/>
           </a:p>
@@ -1060,7 +1060,7 @@
           <a:p>
             <a:fld id="{1D5F9507-541F-2F48-AAED-03061445739A}" type="datetimeFigureOut">
               <a:rPr lang="en-US" smtClean="0"/>
-              <a:t>10/11/12</a:t>
+              <a:t>10/16/12</a:t>
             </a:fld>
             <a:endParaRPr lang="en-US"/>
           </a:p>
@@ -1348,7 +1348,7 @@
           <a:p>
             <a:fld id="{1D5F9507-541F-2F48-AAED-03061445739A}" type="datetimeFigureOut">
               <a:rPr lang="en-US" smtClean="0"/>
-              <a:t>10/11/12</a:t>
+              <a:t>10/16/12</a:t>
             </a:fld>
             <a:endParaRPr lang="en-US"/>
           </a:p>
@@ -1770,7 +1770,7 @@
           <a:p>
             <a:fld id="{1D5F9507-541F-2F48-AAED-03061445739A}" type="datetimeFigureOut">
               <a:rPr lang="en-US" smtClean="0"/>
-              <a:t>10/11/12</a:t>
+              <a:t>10/16/12</a:t>
             </a:fld>
             <a:endParaRPr lang="en-US"/>
           </a:p>
@@ -1888,7 +1888,7 @@
           <a:p>
             <a:fld id="{1D5F9507-541F-2F48-AAED-03061445739A}" type="datetimeFigureOut">
               <a:rPr lang="en-US" smtClean="0"/>
-              <a:t>10/11/12</a:t>
+              <a:t>10/16/12</a:t>
             </a:fld>
             <a:endParaRPr lang="en-US"/>
           </a:p>
@@ -1983,7 +1983,7 @@
           <a:p>
             <a:fld id="{1D5F9507-541F-2F48-AAED-03061445739A}" type="datetimeFigureOut">
               <a:rPr lang="en-US" smtClean="0"/>
-              <a:t>10/11/12</a:t>
+              <a:t>10/16/12</a:t>
             </a:fld>
             <a:endParaRPr lang="en-US"/>
           </a:p>
@@ -2260,7 +2260,7 @@
           <a:p>
             <a:fld id="{1D5F9507-541F-2F48-AAED-03061445739A}" type="datetimeFigureOut">
               <a:rPr lang="en-US" smtClean="0"/>
-              <a:t>10/11/12</a:t>
+              <a:t>10/16/12</a:t>
             </a:fld>
             <a:endParaRPr lang="en-US"/>
           </a:p>
@@ -2513,7 +2513,7 @@
           <a:p>
             <a:fld id="{1D5F9507-541F-2F48-AAED-03061445739A}" type="datetimeFigureOut">
               <a:rPr lang="en-US" smtClean="0"/>
-              <a:t>10/11/12</a:t>
+              <a:t>10/16/12</a:t>
             </a:fld>
             <a:endParaRPr lang="en-US"/>
           </a:p>
@@ -2726,7 +2726,7 @@
           <a:p>
             <a:fld id="{1D5F9507-541F-2F48-AAED-03061445739A}" type="datetimeFigureOut">
               <a:rPr lang="en-US" smtClean="0"/>
-              <a:t>10/11/12</a:t>
+              <a:t>10/16/12</a:t>
             </a:fld>
             <a:endParaRPr lang="en-US"/>
           </a:p>
@@ -4047,11 +4047,6 @@
               </a:rPr>
               <a:t>It is green, purple, red….</a:t>
             </a:r>
-            <a:endParaRPr lang="en-US" sz="1000" dirty="0">
-              <a:solidFill>
-                <a:srgbClr val="D9D9D9"/>
-              </a:solidFill>
-            </a:endParaRPr>
           </a:p>
         </p:txBody>
       </p:sp>
@@ -6865,12 +6860,8 @@
           <a:lstStyle/>
           <a:p>
             <a:r>
-              <a:rPr lang="en-US" sz="1200" dirty="0"/>
-              <a:t> </a:t>
-            </a:r>
-            <a:r>
               <a:rPr lang="en-US" sz="1200" dirty="0" smtClean="0"/>
-              <a:t>  My Plants</a:t>
+              <a:t>Identification</a:t>
             </a:r>
             <a:endParaRPr lang="en-US" sz="1200" dirty="0"/>
           </a:p>
@@ -7316,7 +7307,7 @@
             <a:pPr algn="ctr"/>
             <a:r>
               <a:rPr lang="en-US" sz="1200" dirty="0" smtClean="0"/>
-              <a:t>Identification</a:t>
+              <a:t>My Plants</a:t>
             </a:r>
             <a:endParaRPr lang="en-US" sz="1200" dirty="0"/>
           </a:p>

</xml_diff>